<commit_message>
Added a note regarding results
</commit_message>
<xml_diff>
--- a/docs/Delaunay_Triangulation.pptx
+++ b/docs/Delaunay_Triangulation.pptx
@@ -6491,7 +6491,7 @@
           <a:p>
             <a:fld id="{3E273BAE-0EF1-4480-9D41-1F735C1D7F9F}" type="datetimeFigureOut">
               <a:rPr lang="en-US" smtClean="0"/>
-              <a:t>5/10/2017</a:t>
+              <a:t>5/15/2017</a:t>
             </a:fld>
             <a:endParaRPr lang="en-US"/>
           </a:p>
@@ -6973,7 +6973,7 @@
           <a:p>
             <a:fld id="{B69D55E8-0259-4921-B07F-B3D4BE4D3BFC}" type="datetimeFigureOut">
               <a:rPr lang="en-US" smtClean="0"/>
-              <a:t>5/10/2017</a:t>
+              <a:t>5/15/2017</a:t>
             </a:fld>
             <a:endParaRPr lang="en-US"/>
           </a:p>
@@ -7173,7 +7173,7 @@
           <a:p>
             <a:fld id="{B69D55E8-0259-4921-B07F-B3D4BE4D3BFC}" type="datetimeFigureOut">
               <a:rPr lang="en-US" smtClean="0"/>
-              <a:t>5/10/2017</a:t>
+              <a:t>5/15/2017</a:t>
             </a:fld>
             <a:endParaRPr lang="en-US"/>
           </a:p>
@@ -7353,7 +7353,7 @@
           <a:p>
             <a:fld id="{B69D55E8-0259-4921-B07F-B3D4BE4D3BFC}" type="datetimeFigureOut">
               <a:rPr lang="en-US" smtClean="0"/>
-              <a:t>5/10/2017</a:t>
+              <a:t>5/15/2017</a:t>
             </a:fld>
             <a:endParaRPr lang="en-US"/>
           </a:p>
@@ -7592,7 +7592,7 @@
           <a:p>
             <a:fld id="{B69D55E8-0259-4921-B07F-B3D4BE4D3BFC}" type="datetimeFigureOut">
               <a:rPr lang="en-US" smtClean="0"/>
-              <a:t>5/10/2017</a:t>
+              <a:t>5/15/2017</a:t>
             </a:fld>
             <a:endParaRPr lang="en-US"/>
           </a:p>
@@ -7948,7 +7948,7 @@
           <a:p>
             <a:fld id="{B69D55E8-0259-4921-B07F-B3D4BE4D3BFC}" type="datetimeFigureOut">
               <a:rPr lang="en-US" smtClean="0"/>
-              <a:t>5/10/2017</a:t>
+              <a:t>5/15/2017</a:t>
             </a:fld>
             <a:endParaRPr lang="en-US"/>
           </a:p>
@@ -8180,7 +8180,7 @@
           <a:p>
             <a:fld id="{B69D55E8-0259-4921-B07F-B3D4BE4D3BFC}" type="datetimeFigureOut">
               <a:rPr lang="en-US" smtClean="0"/>
-              <a:t>5/10/2017</a:t>
+              <a:t>5/15/2017</a:t>
             </a:fld>
             <a:endParaRPr lang="en-US"/>
           </a:p>
@@ -8547,7 +8547,7 @@
           <a:p>
             <a:fld id="{B69D55E8-0259-4921-B07F-B3D4BE4D3BFC}" type="datetimeFigureOut">
               <a:rPr lang="en-US" smtClean="0"/>
-              <a:t>5/10/2017</a:t>
+              <a:t>5/15/2017</a:t>
             </a:fld>
             <a:endParaRPr lang="en-US"/>
           </a:p>
@@ -8665,7 +8665,7 @@
           <a:p>
             <a:fld id="{B69D55E8-0259-4921-B07F-B3D4BE4D3BFC}" type="datetimeFigureOut">
               <a:rPr lang="en-US" smtClean="0"/>
-              <a:t>5/10/2017</a:t>
+              <a:t>5/15/2017</a:t>
             </a:fld>
             <a:endParaRPr lang="en-US"/>
           </a:p>
@@ -8760,7 +8760,7 @@
           <a:p>
             <a:fld id="{B69D55E8-0259-4921-B07F-B3D4BE4D3BFC}" type="datetimeFigureOut">
               <a:rPr lang="en-US" smtClean="0"/>
-              <a:t>5/10/2017</a:t>
+              <a:t>5/15/2017</a:t>
             </a:fld>
             <a:endParaRPr lang="en-US"/>
           </a:p>
@@ -9037,7 +9037,7 @@
           <a:p>
             <a:fld id="{B69D55E8-0259-4921-B07F-B3D4BE4D3BFC}" type="datetimeFigureOut">
               <a:rPr lang="en-US" smtClean="0"/>
-              <a:t>5/10/2017</a:t>
+              <a:t>5/15/2017</a:t>
             </a:fld>
             <a:endParaRPr lang="en-US"/>
           </a:p>
@@ -9294,7 +9294,7 @@
           <a:p>
             <a:fld id="{B69D55E8-0259-4921-B07F-B3D4BE4D3BFC}" type="datetimeFigureOut">
               <a:rPr lang="en-US" smtClean="0"/>
-              <a:t>5/10/2017</a:t>
+              <a:t>5/15/2017</a:t>
             </a:fld>
             <a:endParaRPr lang="en-US"/>
           </a:p>
@@ -9507,7 +9507,7 @@
           <a:p>
             <a:fld id="{B69D55E8-0259-4921-B07F-B3D4BE4D3BFC}" type="datetimeFigureOut">
               <a:rPr lang="en-US" smtClean="0"/>
-              <a:t>5/10/2017</a:t>
+              <a:t>5/15/2017</a:t>
             </a:fld>
             <a:endParaRPr lang="en-US"/>
           </a:p>
@@ -11655,13 +11655,29 @@
         <p:spPr/>
         <p:txBody>
           <a:bodyPr>
-            <a:normAutofit/>
+            <a:normAutofit fontScale="92500" lnSpcReduction="20000"/>
           </a:bodyPr>
           <a:lstStyle/>
           <a:p>
             <a:r>
               <a:rPr lang="en-US" dirty="0"/>
               <a:t>Run-times averaged over 3-5 jobs/runs</a:t>
+            </a:r>
+          </a:p>
+          <a:p>
+            <a:r>
+              <a:rPr lang="en-US" dirty="0"/>
+              <a:t>Time spent on reading input file and writing the results to output file is ignored</a:t>
+            </a:r>
+          </a:p>
+          <a:p>
+            <a:r>
+              <a:rPr lang="en-US" u="sng" dirty="0"/>
+              <a:t>Only Computation Time </a:t>
+            </a:r>
+            <a:r>
+              <a:rPr lang="en-US" dirty="0"/>
+              <a:t>(with communication cost) is used in analysis</a:t>
             </a:r>
           </a:p>
           <a:p>

</xml_diff>